<commit_message>
Fixed bugs on resources and database
</commit_message>
<xml_diff>
--- a/SCREENS.pptx
+++ b/SCREENS.pptx
@@ -8,6 +8,7 @@
     <p:sldId id="256" r:id="rId2"/>
     <p:sldId id="257" r:id="rId3"/>
     <p:sldId id="258" r:id="rId4"/>
+    <p:sldId id="259" r:id="rId5"/>
   </p:sldIdLst>
   <p:sldSz cx="12192000" cy="6858000"/>
   <p:notesSz cx="6858000" cy="9144000"/>
@@ -106,12 +107,17 @@
       </a:defRPr>
     </a:lvl9pPr>
   </p:defaultTextStyle>
+  <p:extLst>
+    <p:ext uri="{EFAFB233-063F-42B5-8137-9DF3F51BA10A}">
+      <p15:sldGuideLst xmlns:p15="http://schemas.microsoft.com/office/powerpoint/2012/main"/>
+    </p:ext>
+  </p:extLst>
 </p:presentation>
 </file>
 
 <file path=ppt/commentAuthors.xml><?xml version="1.0" encoding="utf-8"?>
 <p:cmAuthorLst xmlns:a="http://schemas.openxmlformats.org/drawingml/2006/main" xmlns:r="http://schemas.openxmlformats.org/officeDocument/2006/relationships" xmlns:p="http://schemas.openxmlformats.org/presentationml/2006/main">
-  <p:cmAuthor id="1" name="Hugo Barbachano" initials="HB" lastIdx="3" clrIdx="0">
+  <p:cmAuthor id="1" name="Hugo Barbachano" initials="HB" lastIdx="4" clrIdx="0">
     <p:extLst>
       <p:ext uri="{19B8F6BF-5375-455C-9EA6-DF929625EA0E}">
         <p15:presenceInfo xmlns:p15="http://schemas.microsoft.com/office/powerpoint/2012/main" userId="08ce109d1f53d498" providerId="Windows Live"/>
@@ -139,16 +145,16 @@
 <p:cmLst xmlns:a="http://schemas.openxmlformats.org/drawingml/2006/main" xmlns:r="http://schemas.openxmlformats.org/officeDocument/2006/relationships" xmlns:p="http://schemas.openxmlformats.org/presentationml/2006/main">
   <p:cm authorId="1" dt="2017-04-25T13:17:00.608" idx="2">
     <p:pos x="5499" y="2947"/>
-    <p:text>Make Reservation LInk to reservation screen</p:text>
-    <p:extLst>
+    <p:text>Seller can click LInk to reservation screen</p:text>
+    <p:extLst mod="1">
       <p:ext uri="{C676402C-5697-4E1C-873F-D02D1690AC5C}">
         <p15:threadingInfo xmlns:p15="http://schemas.microsoft.com/office/powerpoint/2012/main" timeZoneBias="-120"/>
       </p:ext>
     </p:extLst>
   </p:cm>
-  <p:cm authorId="1" dt="2017-04-25T13:20:19.359" idx="3">
-    <p:pos x="2450" y="455"/>
-    <p:text/>
+  <p:cm authorId="1" dt="2017-05-02T12:13:09.244" idx="4">
+    <p:pos x="2272" y="3011"/>
+    <p:text>The admin can change the price here</p:text>
     <p:extLst>
       <p:ext uri="{C676402C-5697-4E1C-873F-D02D1690AC5C}">
         <p15:threadingInfo xmlns:p15="http://schemas.microsoft.com/office/powerpoint/2012/main" timeZoneBias="-120"/>
@@ -287,7 +293,7 @@
           <a:p>
             <a:fld id="{817A11E8-D9A6-4D19-8994-F80F5DC5E510}" type="datetimeFigureOut">
               <a:rPr lang="en-US" smtClean="0"/>
-              <a:t>25-Apr-17</a:t>
+              <a:t>02-May-17</a:t>
             </a:fld>
             <a:endParaRPr lang="en-US"/>
           </a:p>
@@ -455,7 +461,7 @@
           <a:p>
             <a:fld id="{817A11E8-D9A6-4D19-8994-F80F5DC5E510}" type="datetimeFigureOut">
               <a:rPr lang="en-US" smtClean="0"/>
-              <a:t>25-Apr-17</a:t>
+              <a:t>02-May-17</a:t>
             </a:fld>
             <a:endParaRPr lang="en-US"/>
           </a:p>
@@ -633,7 +639,7 @@
           <a:p>
             <a:fld id="{817A11E8-D9A6-4D19-8994-F80F5DC5E510}" type="datetimeFigureOut">
               <a:rPr lang="en-US" smtClean="0"/>
-              <a:t>25-Apr-17</a:t>
+              <a:t>02-May-17</a:t>
             </a:fld>
             <a:endParaRPr lang="en-US"/>
           </a:p>
@@ -801,7 +807,7 @@
           <a:p>
             <a:fld id="{817A11E8-D9A6-4D19-8994-F80F5DC5E510}" type="datetimeFigureOut">
               <a:rPr lang="en-US" smtClean="0"/>
-              <a:t>25-Apr-17</a:t>
+              <a:t>02-May-17</a:t>
             </a:fld>
             <a:endParaRPr lang="en-US"/>
           </a:p>
@@ -1046,7 +1052,7 @@
           <a:p>
             <a:fld id="{817A11E8-D9A6-4D19-8994-F80F5DC5E510}" type="datetimeFigureOut">
               <a:rPr lang="en-US" smtClean="0"/>
-              <a:t>25-Apr-17</a:t>
+              <a:t>02-May-17</a:t>
             </a:fld>
             <a:endParaRPr lang="en-US"/>
           </a:p>
@@ -1275,7 +1281,7 @@
           <a:p>
             <a:fld id="{817A11E8-D9A6-4D19-8994-F80F5DC5E510}" type="datetimeFigureOut">
               <a:rPr lang="en-US" smtClean="0"/>
-              <a:t>25-Apr-17</a:t>
+              <a:t>02-May-17</a:t>
             </a:fld>
             <a:endParaRPr lang="en-US"/>
           </a:p>
@@ -1639,7 +1645,7 @@
           <a:p>
             <a:fld id="{817A11E8-D9A6-4D19-8994-F80F5DC5E510}" type="datetimeFigureOut">
               <a:rPr lang="en-US" smtClean="0"/>
-              <a:t>25-Apr-17</a:t>
+              <a:t>02-May-17</a:t>
             </a:fld>
             <a:endParaRPr lang="en-US"/>
           </a:p>
@@ -1756,7 +1762,7 @@
           <a:p>
             <a:fld id="{817A11E8-D9A6-4D19-8994-F80F5DC5E510}" type="datetimeFigureOut">
               <a:rPr lang="en-US" smtClean="0"/>
-              <a:t>25-Apr-17</a:t>
+              <a:t>02-May-17</a:t>
             </a:fld>
             <a:endParaRPr lang="en-US"/>
           </a:p>
@@ -1851,7 +1857,7 @@
           <a:p>
             <a:fld id="{817A11E8-D9A6-4D19-8994-F80F5DC5E510}" type="datetimeFigureOut">
               <a:rPr lang="en-US" smtClean="0"/>
-              <a:t>25-Apr-17</a:t>
+              <a:t>02-May-17</a:t>
             </a:fld>
             <a:endParaRPr lang="en-US"/>
           </a:p>
@@ -2126,7 +2132,7 @@
           <a:p>
             <a:fld id="{817A11E8-D9A6-4D19-8994-F80F5DC5E510}" type="datetimeFigureOut">
               <a:rPr lang="en-US" smtClean="0"/>
-              <a:t>25-Apr-17</a:t>
+              <a:t>02-May-17</a:t>
             </a:fld>
             <a:endParaRPr lang="en-US"/>
           </a:p>
@@ -2378,7 +2384,7 @@
           <a:p>
             <a:fld id="{817A11E8-D9A6-4D19-8994-F80F5DC5E510}" type="datetimeFigureOut">
               <a:rPr lang="en-US" smtClean="0"/>
-              <a:t>25-Apr-17</a:t>
+              <a:t>02-May-17</a:t>
             </a:fld>
             <a:endParaRPr lang="en-US"/>
           </a:p>
@@ -2589,7 +2595,7 @@
           <a:p>
             <a:fld id="{817A11E8-D9A6-4D19-8994-F80F5DC5E510}" type="datetimeFigureOut">
               <a:rPr lang="en-US" smtClean="0"/>
-              <a:t>25-Apr-17</a:t>
+              <a:t>02-May-17</a:t>
             </a:fld>
             <a:endParaRPr lang="en-US"/>
           </a:p>
@@ -3375,7 +3381,7 @@
           <a:p>
             <a:r>
               <a:rPr lang="en-US" dirty="0"/>
-              <a:t>Show &lt;Name&gt;</a:t>
+              <a:t>SHOW</a:t>
             </a:r>
           </a:p>
         </p:txBody>
@@ -3443,14 +3449,14 @@
           <p:nvPr>
             <p:extLst>
               <p:ext uri="{D42A27DB-BD31-4B8C-83A1-F6EECF244321}">
-                <p14:modId xmlns:p14="http://schemas.microsoft.com/office/powerpoint/2010/main" val="989527614"/>
+                <p14:modId xmlns:p14="http://schemas.microsoft.com/office/powerpoint/2010/main" val="944326934"/>
               </p:ext>
             </p:extLst>
           </p:nvPr>
         </p:nvGraphicFramePr>
         <p:xfrm>
           <a:off x="838200" y="4332883"/>
-          <a:ext cx="8128000" cy="1478280"/>
+          <a:ext cx="8128000" cy="1747520"/>
         </p:xfrm>
         <a:graphic>
           <a:graphicData uri="http://schemas.openxmlformats.org/drawingml/2006/table">
@@ -3586,7 +3592,7 @@
                     <a:p>
                       <a:r>
                         <a:rPr lang="en-US" dirty="0"/>
-                        <a:t>Make Reservation</a:t>
+                        <a:t>Make Reservation, Apply, Cancel</a:t>
                       </a:r>
                     </a:p>
                   </a:txBody>
@@ -3832,10 +3838,477 @@
           </a:p>
         </p:txBody>
       </p:sp>
+      <p:graphicFrame>
+        <p:nvGraphicFramePr>
+          <p:cNvPr id="4" name="Table 3"/>
+          <p:cNvGraphicFramePr>
+            <a:graphicFrameLocks noGrp="1"/>
+          </p:cNvGraphicFramePr>
+          <p:nvPr>
+            <p:extLst>
+              <p:ext uri="{D42A27DB-BD31-4B8C-83A1-F6EECF244321}">
+                <p14:modId xmlns:p14="http://schemas.microsoft.com/office/powerpoint/2010/main" val="1192669108"/>
+              </p:ext>
+            </p:extLst>
+          </p:nvPr>
+        </p:nvGraphicFramePr>
+        <p:xfrm>
+          <a:off x="838200" y="2586967"/>
+          <a:ext cx="8128000" cy="2123440"/>
+        </p:xfrm>
+        <a:graphic>
+          <a:graphicData uri="http://schemas.openxmlformats.org/drawingml/2006/table">
+            <a:tbl>
+              <a:tblPr firstRow="1" bandRow="1">
+                <a:tableStyleId>{5C22544A-7EE6-4342-B048-85BDC9FD1C3A}</a:tableStyleId>
+              </a:tblPr>
+              <a:tblGrid>
+                <a:gridCol w="1625600">
+                  <a:extLst>
+                    <a:ext uri="{9D8B030D-6E8A-4147-A177-3AD203B41FA5}">
+                      <a16:colId xmlns:a16="http://schemas.microsoft.com/office/drawing/2014/main" val="1561835688"/>
+                    </a:ext>
+                  </a:extLst>
+                </a:gridCol>
+                <a:gridCol w="1625600">
+                  <a:extLst>
+                    <a:ext uri="{9D8B030D-6E8A-4147-A177-3AD203B41FA5}">
+                      <a16:colId xmlns:a16="http://schemas.microsoft.com/office/drawing/2014/main" val="1330726353"/>
+                    </a:ext>
+                  </a:extLst>
+                </a:gridCol>
+                <a:gridCol w="1625600">
+                  <a:extLst>
+                    <a:ext uri="{9D8B030D-6E8A-4147-A177-3AD203B41FA5}">
+                      <a16:colId xmlns:a16="http://schemas.microsoft.com/office/drawing/2014/main" val="1156069128"/>
+                    </a:ext>
+                  </a:extLst>
+                </a:gridCol>
+                <a:gridCol w="1625600">
+                  <a:extLst>
+                    <a:ext uri="{9D8B030D-6E8A-4147-A177-3AD203B41FA5}">
+                      <a16:colId xmlns:a16="http://schemas.microsoft.com/office/drawing/2014/main" val="1391188401"/>
+                    </a:ext>
+                  </a:extLst>
+                </a:gridCol>
+                <a:gridCol w="1625600">
+                  <a:extLst>
+                    <a:ext uri="{9D8B030D-6E8A-4147-A177-3AD203B41FA5}">
+                      <a16:colId xmlns:a16="http://schemas.microsoft.com/office/drawing/2014/main" val="2355065485"/>
+                    </a:ext>
+                  </a:extLst>
+                </a:gridCol>
+              </a:tblGrid>
+              <a:tr h="370840">
+                <a:tc>
+                  <a:txBody>
+                    <a:bodyPr/>
+                    <a:lstStyle/>
+                    <a:p>
+                      <a:r>
+                        <a:rPr lang="en-US" dirty="0"/>
+                        <a:t>Client</a:t>
+                      </a:r>
+                    </a:p>
+                  </a:txBody>
+                  <a:tcPr/>
+                </a:tc>
+                <a:tc>
+                  <a:txBody>
+                    <a:bodyPr/>
+                    <a:lstStyle/>
+                    <a:p>
+                      <a:r>
+                        <a:rPr lang="en-US" dirty="0"/>
+                        <a:t>Number</a:t>
+                      </a:r>
+                    </a:p>
+                  </a:txBody>
+                  <a:tcPr/>
+                </a:tc>
+                <a:tc>
+                  <a:txBody>
+                    <a:bodyPr/>
+                    <a:lstStyle/>
+                    <a:p>
+                      <a:r>
+                        <a:rPr lang="en-US" dirty="0"/>
+                        <a:t>Show</a:t>
+                      </a:r>
+                    </a:p>
+                  </a:txBody>
+                  <a:tcPr/>
+                </a:tc>
+                <a:tc>
+                  <a:txBody>
+                    <a:bodyPr/>
+                    <a:lstStyle/>
+                    <a:p>
+                      <a:r>
+                        <a:rPr lang="en-US" dirty="0"/>
+                        <a:t>Category</a:t>
+                      </a:r>
+                    </a:p>
+                  </a:txBody>
+                  <a:tcPr/>
+                </a:tc>
+                <a:tc>
+                  <a:txBody>
+                    <a:bodyPr/>
+                    <a:lstStyle/>
+                    <a:p>
+                      <a:r>
+                        <a:rPr lang="en-US" dirty="0"/>
+                        <a:t>Actions</a:t>
+                      </a:r>
+                    </a:p>
+                  </a:txBody>
+                  <a:tcPr/>
+                </a:tc>
+                <a:extLst>
+                  <a:ext uri="{0D108BD9-81ED-4DB2-BD59-A6C34878D82A}">
+                    <a16:rowId xmlns:a16="http://schemas.microsoft.com/office/drawing/2014/main" val="543414106"/>
+                  </a:ext>
+                </a:extLst>
+              </a:tr>
+              <a:tr h="370840">
+                <a:tc>
+                  <a:txBody>
+                    <a:bodyPr/>
+                    <a:lstStyle/>
+                    <a:p>
+                      <a:endParaRPr lang="en-US"/>
+                    </a:p>
+                  </a:txBody>
+                  <a:tcPr/>
+                </a:tc>
+                <a:tc>
+                  <a:txBody>
+                    <a:bodyPr/>
+                    <a:lstStyle/>
+                    <a:p>
+                      <a:endParaRPr lang="en-US"/>
+                    </a:p>
+                  </a:txBody>
+                  <a:tcPr/>
+                </a:tc>
+                <a:tc>
+                  <a:txBody>
+                    <a:bodyPr/>
+                    <a:lstStyle/>
+                    <a:p>
+                      <a:endParaRPr lang="en-US"/>
+                    </a:p>
+                  </a:txBody>
+                  <a:tcPr/>
+                </a:tc>
+                <a:tc>
+                  <a:txBody>
+                    <a:bodyPr/>
+                    <a:lstStyle/>
+                    <a:p>
+                      <a:endParaRPr lang="en-US"/>
+                    </a:p>
+                  </a:txBody>
+                  <a:tcPr/>
+                </a:tc>
+                <a:tc>
+                  <a:txBody>
+                    <a:bodyPr/>
+                    <a:lstStyle/>
+                    <a:p>
+                      <a:r>
+                        <a:rPr lang="en-US" dirty="0"/>
+                        <a:t>Apply, Cancel, Delete</a:t>
+                      </a:r>
+                    </a:p>
+                  </a:txBody>
+                  <a:tcPr/>
+                </a:tc>
+                <a:extLst>
+                  <a:ext uri="{0D108BD9-81ED-4DB2-BD59-A6C34878D82A}">
+                    <a16:rowId xmlns:a16="http://schemas.microsoft.com/office/drawing/2014/main" val="1422113221"/>
+                  </a:ext>
+                </a:extLst>
+              </a:tr>
+              <a:tr h="370840">
+                <a:tc>
+                  <a:txBody>
+                    <a:bodyPr/>
+                    <a:lstStyle/>
+                    <a:p>
+                      <a:endParaRPr lang="en-US"/>
+                    </a:p>
+                  </a:txBody>
+                  <a:tcPr/>
+                </a:tc>
+                <a:tc>
+                  <a:txBody>
+                    <a:bodyPr/>
+                    <a:lstStyle/>
+                    <a:p>
+                      <a:endParaRPr lang="en-US"/>
+                    </a:p>
+                  </a:txBody>
+                  <a:tcPr/>
+                </a:tc>
+                <a:tc>
+                  <a:txBody>
+                    <a:bodyPr/>
+                    <a:lstStyle/>
+                    <a:p>
+                      <a:endParaRPr lang="en-US"/>
+                    </a:p>
+                  </a:txBody>
+                  <a:tcPr/>
+                </a:tc>
+                <a:tc>
+                  <a:txBody>
+                    <a:bodyPr/>
+                    <a:lstStyle/>
+                    <a:p>
+                      <a:endParaRPr lang="en-US"/>
+                    </a:p>
+                  </a:txBody>
+                  <a:tcPr/>
+                </a:tc>
+                <a:tc>
+                  <a:txBody>
+                    <a:bodyPr/>
+                    <a:lstStyle/>
+                    <a:p>
+                      <a:endParaRPr lang="en-US"/>
+                    </a:p>
+                  </a:txBody>
+                  <a:tcPr/>
+                </a:tc>
+                <a:extLst>
+                  <a:ext uri="{0D108BD9-81ED-4DB2-BD59-A6C34878D82A}">
+                    <a16:rowId xmlns:a16="http://schemas.microsoft.com/office/drawing/2014/main" val="212929551"/>
+                  </a:ext>
+                </a:extLst>
+              </a:tr>
+              <a:tr h="370840">
+                <a:tc>
+                  <a:txBody>
+                    <a:bodyPr/>
+                    <a:lstStyle/>
+                    <a:p>
+                      <a:endParaRPr lang="en-US"/>
+                    </a:p>
+                  </a:txBody>
+                  <a:tcPr/>
+                </a:tc>
+                <a:tc>
+                  <a:txBody>
+                    <a:bodyPr/>
+                    <a:lstStyle/>
+                    <a:p>
+                      <a:endParaRPr lang="en-US"/>
+                    </a:p>
+                  </a:txBody>
+                  <a:tcPr/>
+                </a:tc>
+                <a:tc>
+                  <a:txBody>
+                    <a:bodyPr/>
+                    <a:lstStyle/>
+                    <a:p>
+                      <a:endParaRPr lang="en-US"/>
+                    </a:p>
+                  </a:txBody>
+                  <a:tcPr/>
+                </a:tc>
+                <a:tc>
+                  <a:txBody>
+                    <a:bodyPr/>
+                    <a:lstStyle/>
+                    <a:p>
+                      <a:endParaRPr lang="en-US"/>
+                    </a:p>
+                  </a:txBody>
+                  <a:tcPr/>
+                </a:tc>
+                <a:tc>
+                  <a:txBody>
+                    <a:bodyPr/>
+                    <a:lstStyle/>
+                    <a:p>
+                      <a:endParaRPr lang="en-US"/>
+                    </a:p>
+                  </a:txBody>
+                  <a:tcPr/>
+                </a:tc>
+                <a:extLst>
+                  <a:ext uri="{0D108BD9-81ED-4DB2-BD59-A6C34878D82A}">
+                    <a16:rowId xmlns:a16="http://schemas.microsoft.com/office/drawing/2014/main" val="3331797630"/>
+                  </a:ext>
+                </a:extLst>
+              </a:tr>
+              <a:tr h="370840">
+                <a:tc>
+                  <a:txBody>
+                    <a:bodyPr/>
+                    <a:lstStyle/>
+                    <a:p>
+                      <a:endParaRPr lang="en-US"/>
+                    </a:p>
+                  </a:txBody>
+                  <a:tcPr/>
+                </a:tc>
+                <a:tc>
+                  <a:txBody>
+                    <a:bodyPr/>
+                    <a:lstStyle/>
+                    <a:p>
+                      <a:endParaRPr lang="en-US"/>
+                    </a:p>
+                  </a:txBody>
+                  <a:tcPr/>
+                </a:tc>
+                <a:tc>
+                  <a:txBody>
+                    <a:bodyPr/>
+                    <a:lstStyle/>
+                    <a:p>
+                      <a:endParaRPr lang="en-US"/>
+                    </a:p>
+                  </a:txBody>
+                  <a:tcPr/>
+                </a:tc>
+                <a:tc>
+                  <a:txBody>
+                    <a:bodyPr/>
+                    <a:lstStyle/>
+                    <a:p>
+                      <a:endParaRPr lang="en-US"/>
+                    </a:p>
+                  </a:txBody>
+                  <a:tcPr/>
+                </a:tc>
+                <a:tc>
+                  <a:txBody>
+                    <a:bodyPr/>
+                    <a:lstStyle/>
+                    <a:p>
+                      <a:endParaRPr lang="en-US" dirty="0"/>
+                    </a:p>
+                  </a:txBody>
+                  <a:tcPr/>
+                </a:tc>
+                <a:extLst>
+                  <a:ext uri="{0D108BD9-81ED-4DB2-BD59-A6C34878D82A}">
+                    <a16:rowId xmlns:a16="http://schemas.microsoft.com/office/drawing/2014/main" val="3768907692"/>
+                  </a:ext>
+                </a:extLst>
+              </a:tr>
+            </a:tbl>
+          </a:graphicData>
+        </a:graphic>
+      </p:graphicFrame>
     </p:spTree>
     <p:extLst>
       <p:ext uri="{BB962C8B-B14F-4D97-AF65-F5344CB8AC3E}">
         <p14:creationId xmlns:p14="http://schemas.microsoft.com/office/powerpoint/2010/main" val="274089274"/>
+      </p:ext>
+    </p:extLst>
+  </p:cSld>
+  <p:clrMapOvr>
+    <a:masterClrMapping/>
+  </p:clrMapOvr>
+</p:sld>
+</file>
+
+<file path=ppt/slides/slide4.xml><?xml version="1.0" encoding="utf-8"?>
+<p:sld xmlns:a="http://schemas.openxmlformats.org/drawingml/2006/main" xmlns:r="http://schemas.openxmlformats.org/officeDocument/2006/relationships" xmlns:p="http://schemas.openxmlformats.org/presentationml/2006/main">
+  <p:cSld>
+    <p:spTree>
+      <p:nvGrpSpPr>
+        <p:cNvPr id="1" name=""/>
+        <p:cNvGrpSpPr/>
+        <p:nvPr/>
+      </p:nvGrpSpPr>
+      <p:grpSpPr>
+        <a:xfrm>
+          <a:off x="0" y="0"/>
+          <a:ext cx="0" cy="0"/>
+          <a:chOff x="0" y="0"/>
+          <a:chExt cx="0" cy="0"/>
+        </a:xfrm>
+      </p:grpSpPr>
+      <p:sp>
+        <p:nvSpPr>
+          <p:cNvPr id="2" name="Title 1"/>
+          <p:cNvSpPr>
+            <a:spLocks noGrp="1"/>
+          </p:cNvSpPr>
+          <p:nvPr>
+            <p:ph type="title"/>
+          </p:nvPr>
+        </p:nvSpPr>
+        <p:spPr/>
+        <p:txBody>
+          <a:bodyPr/>
+          <a:lstStyle/>
+          <a:p>
+            <a:r>
+              <a:rPr lang="en-US" dirty="0"/>
+              <a:t>Client</a:t>
+            </a:r>
+          </a:p>
+        </p:txBody>
+      </p:sp>
+      <p:sp>
+        <p:nvSpPr>
+          <p:cNvPr id="3" name="Content Placeholder 2"/>
+          <p:cNvSpPr>
+            <a:spLocks noGrp="1"/>
+          </p:cNvSpPr>
+          <p:nvPr>
+            <p:ph idx="1"/>
+          </p:nvPr>
+        </p:nvSpPr>
+        <p:spPr/>
+        <p:txBody>
+          <a:bodyPr/>
+          <a:lstStyle/>
+          <a:p>
+            <a:r>
+              <a:rPr lang="en-US" dirty="0"/>
+              <a:t>Id</a:t>
+            </a:r>
+          </a:p>
+          <a:p>
+            <a:r>
+              <a:rPr lang="en-US" dirty="0"/>
+              <a:t>First Name</a:t>
+            </a:r>
+          </a:p>
+          <a:p>
+            <a:r>
+              <a:rPr lang="en-US" dirty="0"/>
+              <a:t>Last Name</a:t>
+            </a:r>
+          </a:p>
+          <a:p>
+            <a:r>
+              <a:rPr lang="en-US" dirty="0"/>
+              <a:t>CP</a:t>
+            </a:r>
+          </a:p>
+          <a:p>
+            <a:r>
+              <a:rPr lang="en-US" dirty="0" err="1"/>
+              <a:t>Bdd</a:t>
+            </a:r>
+            <a:endParaRPr lang="en-US" dirty="0"/>
+          </a:p>
+        </p:txBody>
+      </p:sp>
+    </p:spTree>
+    <p:extLst>
+      <p:ext uri="{BB962C8B-B14F-4D97-AF65-F5344CB8AC3E}">
+        <p14:creationId xmlns:p14="http://schemas.microsoft.com/office/powerpoint/2010/main" val="1139773330"/>
       </p:ext>
     </p:extLst>
   </p:cSld>

</xml_diff>

<commit_message>
Started show view and updated .pptx
</commit_message>
<xml_diff>
--- a/SCREENS.pptx
+++ b/SCREENS.pptx
@@ -127,6 +127,10 @@
 </p:cmAuthorLst>
 </file>
 
+<file path=ppt/revisionInfo.xml><?xml version="1.0" encoding="utf-8"?>
+<p1510:revInfo xmlns:a="http://schemas.openxmlformats.org/drawingml/2006/main" xmlns:r="http://schemas.openxmlformats.org/officeDocument/2006/relationships" xmlns:p1510="http://schemas.microsoft.com/office/powerpoint/2015/10/main"/>
+</file>
+
 <file path=ppt/comments/comment1.xml><?xml version="1.0" encoding="utf-8"?>
 <p:cmLst xmlns:a="http://schemas.openxmlformats.org/drawingml/2006/main" xmlns:r="http://schemas.openxmlformats.org/officeDocument/2006/relationships" xmlns:p="http://schemas.openxmlformats.org/presentationml/2006/main">
   <p:cm authorId="1" dt="2017-04-25T13:12:14.202" idx="1">
@@ -293,7 +297,7 @@
           <a:p>
             <a:fld id="{817A11E8-D9A6-4D19-8994-F80F5DC5E510}" type="datetimeFigureOut">
               <a:rPr lang="en-US" smtClean="0"/>
-              <a:t>02-May-17</a:t>
+              <a:t>09-May-17</a:t>
             </a:fld>
             <a:endParaRPr lang="en-US"/>
           </a:p>
@@ -461,7 +465,7 @@
           <a:p>
             <a:fld id="{817A11E8-D9A6-4D19-8994-F80F5DC5E510}" type="datetimeFigureOut">
               <a:rPr lang="en-US" smtClean="0"/>
-              <a:t>02-May-17</a:t>
+              <a:t>09-May-17</a:t>
             </a:fld>
             <a:endParaRPr lang="en-US"/>
           </a:p>
@@ -639,7 +643,7 @@
           <a:p>
             <a:fld id="{817A11E8-D9A6-4D19-8994-F80F5DC5E510}" type="datetimeFigureOut">
               <a:rPr lang="en-US" smtClean="0"/>
-              <a:t>02-May-17</a:t>
+              <a:t>09-May-17</a:t>
             </a:fld>
             <a:endParaRPr lang="en-US"/>
           </a:p>
@@ -807,7 +811,7 @@
           <a:p>
             <a:fld id="{817A11E8-D9A6-4D19-8994-F80F5DC5E510}" type="datetimeFigureOut">
               <a:rPr lang="en-US" smtClean="0"/>
-              <a:t>02-May-17</a:t>
+              <a:t>09-May-17</a:t>
             </a:fld>
             <a:endParaRPr lang="en-US"/>
           </a:p>
@@ -1052,7 +1056,7 @@
           <a:p>
             <a:fld id="{817A11E8-D9A6-4D19-8994-F80F5DC5E510}" type="datetimeFigureOut">
               <a:rPr lang="en-US" smtClean="0"/>
-              <a:t>02-May-17</a:t>
+              <a:t>09-May-17</a:t>
             </a:fld>
             <a:endParaRPr lang="en-US"/>
           </a:p>
@@ -1281,7 +1285,7 @@
           <a:p>
             <a:fld id="{817A11E8-D9A6-4D19-8994-F80F5DC5E510}" type="datetimeFigureOut">
               <a:rPr lang="en-US" smtClean="0"/>
-              <a:t>02-May-17</a:t>
+              <a:t>09-May-17</a:t>
             </a:fld>
             <a:endParaRPr lang="en-US"/>
           </a:p>
@@ -1645,7 +1649,7 @@
           <a:p>
             <a:fld id="{817A11E8-D9A6-4D19-8994-F80F5DC5E510}" type="datetimeFigureOut">
               <a:rPr lang="en-US" smtClean="0"/>
-              <a:t>02-May-17</a:t>
+              <a:t>09-May-17</a:t>
             </a:fld>
             <a:endParaRPr lang="en-US"/>
           </a:p>
@@ -1762,7 +1766,7 @@
           <a:p>
             <a:fld id="{817A11E8-D9A6-4D19-8994-F80F5DC5E510}" type="datetimeFigureOut">
               <a:rPr lang="en-US" smtClean="0"/>
-              <a:t>02-May-17</a:t>
+              <a:t>09-May-17</a:t>
             </a:fld>
             <a:endParaRPr lang="en-US"/>
           </a:p>
@@ -1857,7 +1861,7 @@
           <a:p>
             <a:fld id="{817A11E8-D9A6-4D19-8994-F80F5DC5E510}" type="datetimeFigureOut">
               <a:rPr lang="en-US" smtClean="0"/>
-              <a:t>02-May-17</a:t>
+              <a:t>09-May-17</a:t>
             </a:fld>
             <a:endParaRPr lang="en-US"/>
           </a:p>
@@ -2132,7 +2136,7 @@
           <a:p>
             <a:fld id="{817A11E8-D9A6-4D19-8994-F80F5DC5E510}" type="datetimeFigureOut">
               <a:rPr lang="en-US" smtClean="0"/>
-              <a:t>02-May-17</a:t>
+              <a:t>09-May-17</a:t>
             </a:fld>
             <a:endParaRPr lang="en-US"/>
           </a:p>
@@ -2384,7 +2388,7 @@
           <a:p>
             <a:fld id="{817A11E8-D9A6-4D19-8994-F80F5DC5E510}" type="datetimeFigureOut">
               <a:rPr lang="en-US" smtClean="0"/>
-              <a:t>02-May-17</a:t>
+              <a:t>09-May-17</a:t>
             </a:fld>
             <a:endParaRPr lang="en-US"/>
           </a:p>
@@ -2595,7 +2599,7 @@
           <a:p>
             <a:fld id="{817A11E8-D9A6-4D19-8994-F80F5DC5E510}" type="datetimeFigureOut">
               <a:rPr lang="en-US" smtClean="0"/>
-              <a:t>02-May-17</a:t>
+              <a:t>09-May-17</a:t>
             </a:fld>
             <a:endParaRPr lang="en-US"/>
           </a:p>
@@ -3038,14 +3042,14 @@
           <p:nvPr>
             <p:extLst>
               <p:ext uri="{D42A27DB-BD31-4B8C-83A1-F6EECF244321}">
-                <p14:modId xmlns:p14="http://schemas.microsoft.com/office/powerpoint/2010/main" val="2930703389"/>
+                <p14:modId xmlns:p14="http://schemas.microsoft.com/office/powerpoint/2010/main" val="3976941400"/>
               </p:ext>
             </p:extLst>
           </p:nvPr>
         </p:nvGraphicFramePr>
         <p:xfrm>
-          <a:off x="1944914" y="2417838"/>
-          <a:ext cx="8128000" cy="1854200"/>
+          <a:off x="648928" y="2437502"/>
+          <a:ext cx="10019072" cy="1854200"/>
         </p:xfrm>
         <a:graphic>
           <a:graphicData uri="http://schemas.openxmlformats.org/drawingml/2006/table">
@@ -3054,34 +3058,55 @@
                 <a:tableStyleId>{5C22544A-7EE6-4342-B048-85BDC9FD1C3A}</a:tableStyleId>
               </a:tblPr>
               <a:tblGrid>
-                <a:gridCol w="2032000">
+                <a:gridCol w="1431296">
                   <a:extLst>
                     <a:ext uri="{9D8B030D-6E8A-4147-A177-3AD203B41FA5}">
                       <a16:colId xmlns:a16="http://schemas.microsoft.com/office/drawing/2014/main" val="4202828737"/>
                     </a:ext>
                   </a:extLst>
                 </a:gridCol>
-                <a:gridCol w="2032000">
+                <a:gridCol w="1431296">
                   <a:extLst>
                     <a:ext uri="{9D8B030D-6E8A-4147-A177-3AD203B41FA5}">
                       <a16:colId xmlns:a16="http://schemas.microsoft.com/office/drawing/2014/main" val="858282098"/>
                     </a:ext>
                   </a:extLst>
                 </a:gridCol>
-                <a:gridCol w="2032000">
+                <a:gridCol w="1431296">
+                  <a:extLst>
+                    <a:ext uri="{9D8B030D-6E8A-4147-A177-3AD203B41FA5}">
+                      <a16:colId xmlns:a16="http://schemas.microsoft.com/office/drawing/2014/main" val="1357189311"/>
+                    </a:ext>
+                  </a:extLst>
+                </a:gridCol>
+                <a:gridCol w="1431296">
                   <a:extLst>
                     <a:ext uri="{9D8B030D-6E8A-4147-A177-3AD203B41FA5}">
                       <a16:colId xmlns:a16="http://schemas.microsoft.com/office/drawing/2014/main" val="4048222796"/>
                     </a:ext>
                   </a:extLst>
                 </a:gridCol>
-                <a:gridCol w="2032000">
+                <a:gridCol w="1431296">
                   <a:extLst>
                     <a:ext uri="{9D8B030D-6E8A-4147-A177-3AD203B41FA5}">
                       <a16:colId xmlns:a16="http://schemas.microsoft.com/office/drawing/2014/main" val="3165636140"/>
                     </a:ext>
                   </a:extLst>
                 </a:gridCol>
+                <a:gridCol w="1431296">
+                  <a:extLst>
+                    <a:ext uri="{9D8B030D-6E8A-4147-A177-3AD203B41FA5}">
+                      <a16:colId xmlns:a16="http://schemas.microsoft.com/office/drawing/2014/main" val="103630391"/>
+                    </a:ext>
+                  </a:extLst>
+                </a:gridCol>
+                <a:gridCol w="1431296">
+                  <a:extLst>
+                    <a:ext uri="{9D8B030D-6E8A-4147-A177-3AD203B41FA5}">
+                      <a16:colId xmlns:a16="http://schemas.microsoft.com/office/drawing/2014/main" val="3666179284"/>
+                    </a:ext>
+                  </a:extLst>
+                </a:gridCol>
               </a:tblGrid>
               <a:tr h="370840">
                 <a:tc>
@@ -3117,6 +3142,19 @@
                     <a:p>
                       <a:r>
                         <a:rPr lang="en-US" dirty="0"/>
+                        <a:t>Description</a:t>
+                      </a:r>
+                    </a:p>
+                  </a:txBody>
+                  <a:tcPr/>
+                </a:tc>
+                <a:tc>
+                  <a:txBody>
+                    <a:bodyPr/>
+                    <a:lstStyle/>
+                    <a:p>
+                      <a:r>
+                        <a:rPr lang="en-US" dirty="0"/>
                         <a:t>Date</a:t>
                       </a:r>
                     </a:p>
@@ -3131,6 +3169,32 @@
                       <a:r>
                         <a:rPr lang="en-US" dirty="0"/>
                         <a:t>Places</a:t>
+                      </a:r>
+                    </a:p>
+                  </a:txBody>
+                  <a:tcPr/>
+                </a:tc>
+                <a:tc>
+                  <a:txBody>
+                    <a:bodyPr/>
+                    <a:lstStyle/>
+                    <a:p>
+                      <a:r>
+                        <a:rPr lang="en-US" dirty="0"/>
+                        <a:t>Prices</a:t>
+                      </a:r>
+                    </a:p>
+                  </a:txBody>
+                  <a:tcPr/>
+                </a:tc>
+                <a:tc>
+                  <a:txBody>
+                    <a:bodyPr/>
+                    <a:lstStyle/>
+                    <a:p>
+                      <a:r>
+                        <a:rPr lang="en-US" dirty="0"/>
+                        <a:t>Actions</a:t>
                       </a:r>
                     </a:p>
                   </a:txBody>
@@ -3168,6 +3232,36 @@
                     <a:bodyPr/>
                     <a:lstStyle/>
                     <a:p>
+                      <a:endParaRPr lang="en-US" dirty="0"/>
+                    </a:p>
+                  </a:txBody>
+                  <a:tcPr/>
+                </a:tc>
+                <a:tc>
+                  <a:txBody>
+                    <a:bodyPr/>
+                    <a:lstStyle/>
+                    <a:p>
+                      <a:endParaRPr lang="en-US"/>
+                    </a:p>
+                  </a:txBody>
+                  <a:tcPr/>
+                </a:tc>
+                <a:tc>
+                  <a:txBody>
+                    <a:bodyPr/>
+                    <a:lstStyle/>
+                    <a:p>
+                      <a:endParaRPr lang="en-US" dirty="0"/>
+                    </a:p>
+                  </a:txBody>
+                  <a:tcPr/>
+                </a:tc>
+                <a:tc>
+                  <a:txBody>
+                    <a:bodyPr/>
+                    <a:lstStyle/>
+                    <a:p>
                       <a:endParaRPr lang="en-US"/>
                     </a:p>
                   </a:txBody>
@@ -3230,6 +3324,36 @@
                   </a:txBody>
                   <a:tcPr/>
                 </a:tc>
+                <a:tc>
+                  <a:txBody>
+                    <a:bodyPr/>
+                    <a:lstStyle/>
+                    <a:p>
+                      <a:endParaRPr lang="en-US"/>
+                    </a:p>
+                  </a:txBody>
+                  <a:tcPr/>
+                </a:tc>
+                <a:tc>
+                  <a:txBody>
+                    <a:bodyPr/>
+                    <a:lstStyle/>
+                    <a:p>
+                      <a:endParaRPr lang="en-US"/>
+                    </a:p>
+                  </a:txBody>
+                  <a:tcPr/>
+                </a:tc>
+                <a:tc>
+                  <a:txBody>
+                    <a:bodyPr/>
+                    <a:lstStyle/>
+                    <a:p>
+                      <a:endParaRPr lang="en-US"/>
+                    </a:p>
+                  </a:txBody>
+                  <a:tcPr/>
+                </a:tc>
                 <a:extLst>
                   <a:ext uri="{0D108BD9-81ED-4DB2-BD59-A6C34878D82A}">
                     <a16:rowId xmlns:a16="http://schemas.microsoft.com/office/drawing/2014/main" val="3441918935"/>
@@ -3277,6 +3401,36 @@
                   </a:txBody>
                   <a:tcPr/>
                 </a:tc>
+                <a:tc>
+                  <a:txBody>
+                    <a:bodyPr/>
+                    <a:lstStyle/>
+                    <a:p>
+                      <a:endParaRPr lang="en-US"/>
+                    </a:p>
+                  </a:txBody>
+                  <a:tcPr/>
+                </a:tc>
+                <a:tc>
+                  <a:txBody>
+                    <a:bodyPr/>
+                    <a:lstStyle/>
+                    <a:p>
+                      <a:endParaRPr lang="en-US"/>
+                    </a:p>
+                  </a:txBody>
+                  <a:tcPr/>
+                </a:tc>
+                <a:tc>
+                  <a:txBody>
+                    <a:bodyPr/>
+                    <a:lstStyle/>
+                    <a:p>
+                      <a:endParaRPr lang="en-US"/>
+                    </a:p>
+                  </a:txBody>
+                  <a:tcPr/>
+                </a:tc>
                 <a:extLst>
                   <a:ext uri="{0D108BD9-81ED-4DB2-BD59-A6C34878D82A}">
                     <a16:rowId xmlns:a16="http://schemas.microsoft.com/office/drawing/2014/main" val="389822299"/>
@@ -3309,7 +3463,37 @@
                     <a:bodyPr/>
                     <a:lstStyle/>
                     <a:p>
+                      <a:endParaRPr lang="en-US" dirty="0"/>
+                    </a:p>
+                  </a:txBody>
+                  <a:tcPr/>
+                </a:tc>
+                <a:tc>
+                  <a:txBody>
+                    <a:bodyPr/>
+                    <a:lstStyle/>
+                    <a:p>
                       <a:endParaRPr lang="en-US"/>
+                    </a:p>
+                  </a:txBody>
+                  <a:tcPr/>
+                </a:tc>
+                <a:tc>
+                  <a:txBody>
+                    <a:bodyPr/>
+                    <a:lstStyle/>
+                    <a:p>
+                      <a:endParaRPr lang="en-US" dirty="0"/>
+                    </a:p>
+                  </a:txBody>
+                  <a:tcPr/>
+                </a:tc>
+                <a:tc>
+                  <a:txBody>
+                    <a:bodyPr/>
+                    <a:lstStyle/>
+                    <a:p>
+                      <a:endParaRPr lang="en-US" dirty="0"/>
                     </a:p>
                   </a:txBody>
                   <a:tcPr/>
@@ -3432,6 +3616,12 @@
           <a:p>
             <a:r>
               <a:rPr lang="en-US" dirty="0"/>
+              <a:t>Add reservation</a:t>
+            </a:r>
+          </a:p>
+          <a:p>
+            <a:r>
+              <a:rPr lang="en-US" dirty="0"/>
               <a:t>View Reservations (Link to Reservation list with search by show)</a:t>
             </a:r>
           </a:p>
@@ -3449,13 +3639,13 @@
           <p:nvPr>
             <p:extLst>
               <p:ext uri="{D42A27DB-BD31-4B8C-83A1-F6EECF244321}">
-                <p14:modId xmlns:p14="http://schemas.microsoft.com/office/powerpoint/2010/main" val="944326934"/>
+                <p14:modId xmlns:p14="http://schemas.microsoft.com/office/powerpoint/2010/main" val="756126200"/>
               </p:ext>
             </p:extLst>
           </p:nvPr>
         </p:nvGraphicFramePr>
         <p:xfrm>
-          <a:off x="838200" y="4332883"/>
+          <a:off x="838200" y="4907088"/>
           <a:ext cx="8128000" cy="1747520"/>
         </p:xfrm>
         <a:graphic>

</xml_diff>